<commit_message>
Updated wing results for field
Sent to Giovan, still need to figure out shape
</commit_message>
<xml_diff>
--- a/Gomez analysis plan/2017_11_11 Brazil Field An darlingi results.pptx
+++ b/Gomez analysis plan/2017_11_11 Brazil Field An darlingi results.pptx
@@ -5,7 +5,7 @@
     <p:sldMasterId id="2147483648" r:id="rId1"/>
   </p:sldMasterIdLst>
   <p:notesMasterIdLst>
-    <p:notesMasterId r:id="rId21"/>
+    <p:notesMasterId r:id="rId23"/>
   </p:notesMasterIdLst>
   <p:sldIdLst>
     <p:sldId id="256" r:id="rId2"/>
@@ -27,6 +27,8 @@
     <p:sldId id="270" r:id="rId18"/>
     <p:sldId id="272" r:id="rId19"/>
     <p:sldId id="273" r:id="rId20"/>
+    <p:sldId id="275" r:id="rId21"/>
+    <p:sldId id="276" r:id="rId22"/>
   </p:sldIdLst>
   <p:sldSz cx="12192000" cy="6858000"/>
   <p:notesSz cx="6858000" cy="9144000"/>
@@ -219,7 +221,7 @@
           <a:p>
             <a:fld id="{5DC03B30-E841-400A-9808-DB43D522D272}" type="datetimeFigureOut">
               <a:rPr lang="en-US" smtClean="0"/>
-              <a:t>11/12/2017</a:t>
+              <a:t>11/13/2017</a:t>
             </a:fld>
             <a:endParaRPr lang="en-US"/>
           </a:p>
@@ -1073,7 +1075,7 @@
           <a:p>
             <a:fld id="{F18E78B6-7540-4731-9669-9F3D2A4C60D5}" type="datetimeFigureOut">
               <a:rPr lang="en-US" smtClean="0"/>
-              <a:t>11/12/2017</a:t>
+              <a:t>11/13/2017</a:t>
             </a:fld>
             <a:endParaRPr lang="en-US"/>
           </a:p>
@@ -1271,7 +1273,7 @@
           <a:p>
             <a:fld id="{F18E78B6-7540-4731-9669-9F3D2A4C60D5}" type="datetimeFigureOut">
               <a:rPr lang="en-US" smtClean="0"/>
-              <a:t>11/12/2017</a:t>
+              <a:t>11/13/2017</a:t>
             </a:fld>
             <a:endParaRPr lang="en-US"/>
           </a:p>
@@ -1479,7 +1481,7 @@
           <a:p>
             <a:fld id="{F18E78B6-7540-4731-9669-9F3D2A4C60D5}" type="datetimeFigureOut">
               <a:rPr lang="en-US" smtClean="0"/>
-              <a:t>11/12/2017</a:t>
+              <a:t>11/13/2017</a:t>
             </a:fld>
             <a:endParaRPr lang="en-US"/>
           </a:p>
@@ -1677,7 +1679,7 @@
           <a:p>
             <a:fld id="{F18E78B6-7540-4731-9669-9F3D2A4C60D5}" type="datetimeFigureOut">
               <a:rPr lang="en-US" smtClean="0"/>
-              <a:t>11/12/2017</a:t>
+              <a:t>11/13/2017</a:t>
             </a:fld>
             <a:endParaRPr lang="en-US"/>
           </a:p>
@@ -1952,7 +1954,7 @@
           <a:p>
             <a:fld id="{F18E78B6-7540-4731-9669-9F3D2A4C60D5}" type="datetimeFigureOut">
               <a:rPr lang="en-US" smtClean="0"/>
-              <a:t>11/12/2017</a:t>
+              <a:t>11/13/2017</a:t>
             </a:fld>
             <a:endParaRPr lang="en-US"/>
           </a:p>
@@ -2217,7 +2219,7 @@
           <a:p>
             <a:fld id="{F18E78B6-7540-4731-9669-9F3D2A4C60D5}" type="datetimeFigureOut">
               <a:rPr lang="en-US" smtClean="0"/>
-              <a:t>11/12/2017</a:t>
+              <a:t>11/13/2017</a:t>
             </a:fld>
             <a:endParaRPr lang="en-US"/>
           </a:p>
@@ -2629,7 +2631,7 @@
           <a:p>
             <a:fld id="{F18E78B6-7540-4731-9669-9F3D2A4C60D5}" type="datetimeFigureOut">
               <a:rPr lang="en-US" smtClean="0"/>
-              <a:t>11/12/2017</a:t>
+              <a:t>11/13/2017</a:t>
             </a:fld>
             <a:endParaRPr lang="en-US"/>
           </a:p>
@@ -2770,7 +2772,7 @@
           <a:p>
             <a:fld id="{F18E78B6-7540-4731-9669-9F3D2A4C60D5}" type="datetimeFigureOut">
               <a:rPr lang="en-US" smtClean="0"/>
-              <a:t>11/12/2017</a:t>
+              <a:t>11/13/2017</a:t>
             </a:fld>
             <a:endParaRPr lang="en-US"/>
           </a:p>
@@ -2883,7 +2885,7 @@
           <a:p>
             <a:fld id="{F18E78B6-7540-4731-9669-9F3D2A4C60D5}" type="datetimeFigureOut">
               <a:rPr lang="en-US" smtClean="0"/>
-              <a:t>11/12/2017</a:t>
+              <a:t>11/13/2017</a:t>
             </a:fld>
             <a:endParaRPr lang="en-US"/>
           </a:p>
@@ -3194,7 +3196,7 @@
           <a:p>
             <a:fld id="{F18E78B6-7540-4731-9669-9F3D2A4C60D5}" type="datetimeFigureOut">
               <a:rPr lang="en-US" smtClean="0"/>
-              <a:t>11/12/2017</a:t>
+              <a:t>11/13/2017</a:t>
             </a:fld>
             <a:endParaRPr lang="en-US"/>
           </a:p>
@@ -3482,7 +3484,7 @@
           <a:p>
             <a:fld id="{F18E78B6-7540-4731-9669-9F3D2A4C60D5}" type="datetimeFigureOut">
               <a:rPr lang="en-US" smtClean="0"/>
-              <a:t>11/12/2017</a:t>
+              <a:t>11/13/2017</a:t>
             </a:fld>
             <a:endParaRPr lang="en-US"/>
           </a:p>
@@ -3723,7 +3725,7 @@
           <a:p>
             <a:fld id="{F18E78B6-7540-4731-9669-9F3D2A4C60D5}" type="datetimeFigureOut">
               <a:rPr lang="en-US" smtClean="0"/>
-              <a:t>11/12/2017</a:t>
+              <a:t>11/13/2017</a:t>
             </a:fld>
             <a:endParaRPr lang="en-US"/>
           </a:p>
@@ -4595,7 +4597,7 @@
                   <a:srgbClr val="0070C0"/>
                 </a:solidFill>
               </a:rPr>
-              <a:t>R^2= 0.7035, p&lt; 2.2 e^-16</a:t>
+              <a:t>R^2= 0.2296, p&lt; 3.073e-15</a:t>
             </a:r>
           </a:p>
         </p:txBody>
@@ -13969,7 +13971,7 @@
         <p:spPr>
           <a:xfrm>
             <a:off x="8541531" y="2291953"/>
-            <a:ext cx="3335001" cy="2585323"/>
+            <a:ext cx="3335001" cy="3139321"/>
           </a:xfrm>
           <a:prstGeom prst="rect">
             <a:avLst/>
@@ -14317,89 +14319,93 @@
                 <a:solidFill>
                   <a:srgbClr val="FF0000"/>
                 </a:solidFill>
-              </a:rPr>
-              <a:t>http://</a:t>
-            </a:r>
-            <a:r>
-              <a:rPr lang="es-ES_tradnl" dirty="0" err="1">
-                <a:solidFill>
-                  <a:srgbClr val="FF0000"/>
-                </a:solidFill>
-              </a:rPr>
-              <a:t>www.italian</a:t>
-            </a:r>
-            <a:r>
-              <a:rPr lang="es-ES_tradnl" dirty="0">
-                <a:solidFill>
-                  <a:srgbClr val="FF0000"/>
-                </a:solidFill>
-              </a:rPr>
-              <a:t>-</a:t>
-            </a:r>
-            <a:r>
-              <a:rPr lang="es-ES_tradnl" dirty="0" err="1">
-                <a:solidFill>
-                  <a:srgbClr val="FF0000"/>
-                </a:solidFill>
-              </a:rPr>
-              <a:t>journal</a:t>
-            </a:r>
-            <a:r>
-              <a:rPr lang="es-ES_tradnl" dirty="0">
-                <a:solidFill>
-                  <a:srgbClr val="FF0000"/>
-                </a:solidFill>
-              </a:rPr>
-              <a:t>-of-</a:t>
-            </a:r>
-            <a:r>
-              <a:rPr lang="es-ES_tradnl" dirty="0" err="1">
-                <a:solidFill>
-                  <a:srgbClr val="FF0000"/>
-                </a:solidFill>
-              </a:rPr>
-              <a:t>mammalogy.it</a:t>
-            </a:r>
-            <a:r>
-              <a:rPr lang="es-ES_tradnl" dirty="0">
-                <a:solidFill>
-                  <a:srgbClr val="FF0000"/>
-                </a:solidFill>
-              </a:rPr>
-              <a:t>/</a:t>
-            </a:r>
-            <a:r>
-              <a:rPr lang="es-ES_tradnl" dirty="0" err="1">
-                <a:solidFill>
-                  <a:srgbClr val="FF0000"/>
-                </a:solidFill>
-              </a:rPr>
-              <a:t>article</a:t>
-            </a:r>
-            <a:r>
-              <a:rPr lang="es-ES_tradnl" dirty="0">
-                <a:solidFill>
-                  <a:srgbClr val="FF0000"/>
-                </a:solidFill>
-              </a:rPr>
-              <a:t>/</a:t>
-            </a:r>
-            <a:r>
-              <a:rPr lang="es-ES_tradnl" dirty="0" err="1">
-                <a:solidFill>
-                  <a:srgbClr val="FF0000"/>
-                </a:solidFill>
-              </a:rPr>
-              <a:t>view</a:t>
-            </a:r>
-            <a:r>
-              <a:rPr lang="es-ES_tradnl" dirty="0">
-                <a:solidFill>
-                  <a:srgbClr val="FF0000"/>
-                </a:solidFill>
-              </a:rPr>
-              <a:t>/7691</a:t>
-            </a:r>
+                <a:hlinkClick r:id="rId4"/>
+              </a:rPr>
+              <a:t>http://www.italian-journal-of-mammalogy.it/article/view/7691</a:t>
+            </a:r>
+            <a:endParaRPr lang="es-ES_tradnl" dirty="0">
+              <a:solidFill>
+                <a:srgbClr val="FF0000"/>
+              </a:solidFill>
+            </a:endParaRPr>
+          </a:p>
+          <a:p>
+            <a:endParaRPr lang="es-ES_tradnl" dirty="0">
+              <a:solidFill>
+                <a:srgbClr val="FF0000"/>
+              </a:solidFill>
+            </a:endParaRPr>
+          </a:p>
+          <a:p>
+            <a:r>
+              <a:rPr lang="es-ES_tradnl" b="1" dirty="0">
+                <a:solidFill>
+                  <a:srgbClr val="0070C0"/>
+                </a:solidFill>
+              </a:rPr>
+              <a:t>Ok, </a:t>
+            </a:r>
+            <a:r>
+              <a:rPr lang="es-ES_tradnl" b="1" dirty="0" err="1">
+                <a:solidFill>
+                  <a:srgbClr val="0070C0"/>
+                </a:solidFill>
+              </a:rPr>
+              <a:t>I’m</a:t>
+            </a:r>
+            <a:r>
+              <a:rPr lang="es-ES_tradnl" b="1" dirty="0">
+                <a:solidFill>
+                  <a:srgbClr val="0070C0"/>
+                </a:solidFill>
+              </a:rPr>
+              <a:t> </a:t>
+            </a:r>
+            <a:r>
+              <a:rPr lang="es-ES_tradnl" b="1" dirty="0" err="1">
+                <a:solidFill>
+                  <a:srgbClr val="0070C0"/>
+                </a:solidFill>
+              </a:rPr>
+              <a:t>reading</a:t>
+            </a:r>
+            <a:r>
+              <a:rPr lang="es-ES_tradnl" b="1" dirty="0">
+                <a:solidFill>
+                  <a:srgbClr val="0070C0"/>
+                </a:solidFill>
+              </a:rPr>
+              <a:t> </a:t>
+            </a:r>
+            <a:r>
+              <a:rPr lang="es-ES_tradnl" b="1" dirty="0" err="1">
+                <a:solidFill>
+                  <a:srgbClr val="0070C0"/>
+                </a:solidFill>
+              </a:rPr>
+              <a:t>the</a:t>
+            </a:r>
+            <a:r>
+              <a:rPr lang="es-ES_tradnl" b="1" dirty="0">
+                <a:solidFill>
+                  <a:srgbClr val="0070C0"/>
+                </a:solidFill>
+              </a:rPr>
+              <a:t> </a:t>
+            </a:r>
+            <a:r>
+              <a:rPr lang="es-ES_tradnl" b="1" dirty="0" err="1">
+                <a:solidFill>
+                  <a:srgbClr val="0070C0"/>
+                </a:solidFill>
+              </a:rPr>
+              <a:t>paper</a:t>
+            </a:r>
+            <a:endParaRPr lang="es-ES_tradnl" b="1" dirty="0">
+              <a:solidFill>
+                <a:srgbClr val="0070C0"/>
+              </a:solidFill>
+            </a:endParaRPr>
           </a:p>
         </p:txBody>
       </p:sp>
@@ -15284,7 +15290,7 @@
         <p:spPr>
           <a:xfrm>
             <a:off x="5806751" y="2981444"/>
-            <a:ext cx="4769191" cy="369332"/>
+            <a:ext cx="5974713" cy="1200329"/>
           </a:xfrm>
           <a:prstGeom prst="rect">
             <a:avLst/>
@@ -15391,6 +15397,169 @@
                 </a:solidFill>
               </a:rPr>
               <a:t> ?</a:t>
+            </a:r>
+          </a:p>
+          <a:p>
+            <a:endParaRPr lang="es-ES_tradnl" dirty="0">
+              <a:solidFill>
+                <a:srgbClr val="FF0000"/>
+              </a:solidFill>
+            </a:endParaRPr>
+          </a:p>
+          <a:p>
+            <a:r>
+              <a:rPr lang="es-ES_tradnl" b="1" dirty="0" err="1">
+                <a:solidFill>
+                  <a:srgbClr val="0070C0"/>
+                </a:solidFill>
+              </a:rPr>
+              <a:t>From</a:t>
+            </a:r>
+            <a:r>
+              <a:rPr lang="es-ES_tradnl" b="1" dirty="0">
+                <a:solidFill>
+                  <a:srgbClr val="0070C0"/>
+                </a:solidFill>
+              </a:rPr>
+              <a:t> </a:t>
+            </a:r>
+            <a:r>
+              <a:rPr lang="es-ES_tradnl" b="1" dirty="0" err="1">
+                <a:solidFill>
+                  <a:srgbClr val="0070C0"/>
+                </a:solidFill>
+              </a:rPr>
+              <a:t>this</a:t>
+            </a:r>
+            <a:r>
+              <a:rPr lang="es-ES_tradnl" b="1" dirty="0">
+                <a:solidFill>
+                  <a:srgbClr val="0070C0"/>
+                </a:solidFill>
+              </a:rPr>
+              <a:t> factorial ANOVA, </a:t>
+            </a:r>
+            <a:r>
+              <a:rPr lang="es-ES_tradnl" b="1" dirty="0" err="1">
+                <a:solidFill>
+                  <a:srgbClr val="0070C0"/>
+                </a:solidFill>
+              </a:rPr>
+              <a:t>it</a:t>
+            </a:r>
+            <a:r>
+              <a:rPr lang="es-ES_tradnl" b="1" dirty="0">
+                <a:solidFill>
+                  <a:srgbClr val="0070C0"/>
+                </a:solidFill>
+              </a:rPr>
+              <a:t> looks </a:t>
+            </a:r>
+            <a:r>
+              <a:rPr lang="es-ES_tradnl" b="1" dirty="0" err="1">
+                <a:solidFill>
+                  <a:srgbClr val="0070C0"/>
+                </a:solidFill>
+              </a:rPr>
+              <a:t>like</a:t>
+            </a:r>
+            <a:r>
+              <a:rPr lang="es-ES_tradnl" b="1" dirty="0">
+                <a:solidFill>
+                  <a:srgbClr val="0070C0"/>
+                </a:solidFill>
+              </a:rPr>
+              <a:t> </a:t>
+            </a:r>
+            <a:r>
+              <a:rPr lang="es-ES_tradnl" b="1" dirty="0" err="1">
+                <a:solidFill>
+                  <a:srgbClr val="0070C0"/>
+                </a:solidFill>
+              </a:rPr>
+              <a:t>Biome</a:t>
+            </a:r>
+            <a:r>
+              <a:rPr lang="es-ES_tradnl" b="1" dirty="0">
+                <a:solidFill>
+                  <a:srgbClr val="0070C0"/>
+                </a:solidFill>
+              </a:rPr>
+              <a:t> </a:t>
+            </a:r>
+            <a:r>
+              <a:rPr lang="es-ES_tradnl" b="1" dirty="0" err="1">
+                <a:solidFill>
+                  <a:srgbClr val="0070C0"/>
+                </a:solidFill>
+              </a:rPr>
+              <a:t>alone</a:t>
+            </a:r>
+            <a:r>
+              <a:rPr lang="es-ES_tradnl" b="1" dirty="0">
+                <a:solidFill>
+                  <a:srgbClr val="0070C0"/>
+                </a:solidFill>
+              </a:rPr>
+              <a:t> and </a:t>
+            </a:r>
+            <a:r>
+              <a:rPr lang="es-ES_tradnl" b="1" dirty="0" err="1">
+                <a:solidFill>
+                  <a:srgbClr val="0070C0"/>
+                </a:solidFill>
+              </a:rPr>
+              <a:t>not</a:t>
+            </a:r>
+            <a:r>
+              <a:rPr lang="es-ES_tradnl" b="1" dirty="0">
+                <a:solidFill>
+                  <a:srgbClr val="0070C0"/>
+                </a:solidFill>
+              </a:rPr>
+              <a:t> </a:t>
+            </a:r>
+          </a:p>
+          <a:p>
+            <a:r>
+              <a:rPr lang="es-ES_tradnl" b="1" dirty="0">
+                <a:solidFill>
+                  <a:srgbClr val="0070C0"/>
+                </a:solidFill>
+              </a:rPr>
+              <a:t>Individual </a:t>
+            </a:r>
+            <a:r>
+              <a:rPr lang="es-ES_tradnl" b="1" dirty="0" err="1">
+                <a:solidFill>
+                  <a:srgbClr val="0070C0"/>
+                </a:solidFill>
+              </a:rPr>
+              <a:t>latitude</a:t>
+            </a:r>
+            <a:r>
+              <a:rPr lang="es-ES_tradnl" b="1" dirty="0">
+                <a:solidFill>
+                  <a:srgbClr val="0070C0"/>
+                </a:solidFill>
+              </a:rPr>
+              <a:t> </a:t>
+            </a:r>
+            <a:r>
+              <a:rPr lang="es-ES_tradnl" b="1" dirty="0" err="1">
+                <a:solidFill>
+                  <a:srgbClr val="0070C0"/>
+                </a:solidFill>
+              </a:rPr>
+              <a:t>explains</a:t>
+            </a:r>
+            <a:r>
+              <a:rPr lang="es-ES_tradnl" b="1" dirty="0">
+                <a:solidFill>
+                  <a:srgbClr val="0070C0"/>
+                </a:solidFill>
+              </a:rPr>
+              <a:t> CS?</a:t>
             </a:r>
           </a:p>
         </p:txBody>
@@ -15448,7 +15617,7 @@
           <a:p>
             <a:r>
               <a:rPr lang="en-US" dirty="0"/>
-              <a:t>MANOVA</a:t>
+              <a:t>MANOVA Wing length/CS</a:t>
             </a:r>
           </a:p>
         </p:txBody>
@@ -15733,8 +15902,12 @@
               <a:buNone/>
             </a:pPr>
             <a:r>
+              <a:rPr lang="en-US" sz="1000" dirty="0" err="1"/>
+              <a:t>Signif</a:t>
+            </a:r>
+            <a:r>
               <a:rPr lang="en-US" sz="1000" dirty="0"/>
-              <a:t>---</a:t>
+              <a:t>. codes:  0 ‘***’ 0.001 ‘**’ 0.01 ‘*’ 0.05 ‘.’ 0.1 ‘ ’ 1</a:t>
             </a:r>
           </a:p>
           <a:p>
@@ -15742,12 +15915,8 @@
               <a:buNone/>
             </a:pPr>
             <a:r>
-              <a:rPr lang="en-US" sz="1000" dirty="0" err="1"/>
-              <a:t>Signif</a:t>
-            </a:r>
-            <a:r>
               <a:rPr lang="en-US" sz="1000" dirty="0"/>
-              <a:t>. codes:  0 ‘***’ 0.001 ‘**’ 0.01 ‘*’ 0.05 ‘.’ 0.1 ‘ ’ 1</a:t>
+              <a:t> Response CS :</a:t>
             </a:r>
           </a:p>
           <a:p>
@@ -15756,7 +15925,39 @@
             </a:pPr>
             <a:r>
               <a:rPr lang="en-US" sz="1000" dirty="0"/>
-              <a:t> Response CS :</a:t>
+              <a:t>             </a:t>
+            </a:r>
+            <a:r>
+              <a:rPr lang="en-US" sz="1000" dirty="0" err="1"/>
+              <a:t>Df</a:t>
+            </a:r>
+            <a:r>
+              <a:rPr lang="en-US" sz="1000" dirty="0"/>
+              <a:t> Sum </a:t>
+            </a:r>
+            <a:r>
+              <a:rPr lang="en-US" sz="1000" dirty="0" err="1"/>
+              <a:t>Sq</a:t>
+            </a:r>
+            <a:r>
+              <a:rPr lang="en-US" sz="1000" dirty="0"/>
+              <a:t> Mean </a:t>
+            </a:r>
+            <a:r>
+              <a:rPr lang="en-US" sz="1000" dirty="0" err="1"/>
+              <a:t>Sq</a:t>
+            </a:r>
+            <a:r>
+              <a:rPr lang="en-US" sz="1000" dirty="0"/>
+              <a:t> F value    </a:t>
+            </a:r>
+            <a:r>
+              <a:rPr lang="en-US" sz="1000" dirty="0" err="1"/>
+              <a:t>Pr</a:t>
+            </a:r>
+            <a:r>
+              <a:rPr lang="en-US" sz="1000" dirty="0"/>
+              <a:t>(&gt;F)    </a:t>
             </a:r>
           </a:p>
           <a:p>
@@ -15765,39 +15966,7 @@
             </a:pPr>
             <a:r>
               <a:rPr lang="en-US" sz="1000" dirty="0"/>
-              <a:t>             </a:t>
-            </a:r>
-            <a:r>
-              <a:rPr lang="en-US" sz="1000" dirty="0" err="1"/>
-              <a:t>Df</a:t>
-            </a:r>
-            <a:r>
-              <a:rPr lang="en-US" sz="1000" dirty="0"/>
-              <a:t> Sum </a:t>
-            </a:r>
-            <a:r>
-              <a:rPr lang="en-US" sz="1000" dirty="0" err="1"/>
-              <a:t>Sq</a:t>
-            </a:r>
-            <a:r>
-              <a:rPr lang="en-US" sz="1000" dirty="0"/>
-              <a:t> Mean </a:t>
-            </a:r>
-            <a:r>
-              <a:rPr lang="en-US" sz="1000" dirty="0" err="1"/>
-              <a:t>Sq</a:t>
-            </a:r>
-            <a:r>
-              <a:rPr lang="en-US" sz="1000" dirty="0"/>
-              <a:t> F value    </a:t>
-            </a:r>
-            <a:r>
-              <a:rPr lang="en-US" sz="1000" dirty="0" err="1"/>
-              <a:t>Pr</a:t>
-            </a:r>
-            <a:r>
-              <a:rPr lang="en-US" sz="1000" dirty="0"/>
-              <a:t>(&gt;F)    </a:t>
+              <a:t>Locality      6 3.1201 0.52002  20.465 &lt; 2.2e-16 ***</a:t>
             </a:r>
           </a:p>
           <a:p>
@@ -15806,38 +15975,7 @@
             </a:pPr>
             <a:r>
               <a:rPr lang="en-US" sz="1000" dirty="0"/>
-              <a:t>Locality      6 3.1201 0.52002  20.465 &lt; 2.2e-16 ***</a:t>
-            </a:r>
-          </a:p>
-          <a:p>
-            <a:pPr marL="0" indent="0">
-              <a:buNone/>
-            </a:pPr>
-            <a:r>
-              <a:rPr lang="en-US" sz="1000" dirty="0"/>
               <a:t>Residuals   233 5.9207 0.02541                      </a:t>
-            </a:r>
-          </a:p>
-          <a:p>
-            <a:pPr marL="0" indent="0">
-              <a:buNone/>
-            </a:pPr>
-            <a:r>
-              <a:rPr lang="en-US" sz="1000" dirty="0"/>
-              <a:t>---</a:t>
-            </a:r>
-          </a:p>
-          <a:p>
-            <a:pPr marL="0" indent="0">
-              <a:buNone/>
-            </a:pPr>
-            <a:r>
-              <a:rPr lang="en-US" sz="1000" dirty="0" err="1"/>
-              <a:t>Signif</a:t>
-            </a:r>
-            <a:r>
-              <a:rPr lang="en-US" sz="1000" dirty="0"/>
-              <a:t>. codes:  0 ‘***’ 0.001 ‘**’ 0.01 ‘*’ 0.05 ‘.’ 0.1 ‘ ’ 1</a:t>
             </a:r>
           </a:p>
         </p:txBody>
@@ -15856,7 +15994,7 @@
         </p:nvSpPr>
         <p:spPr>
           <a:xfrm>
-            <a:off x="6025661" y="2078401"/>
+            <a:off x="4572928" y="1438764"/>
             <a:ext cx="4062046" cy="3323987"/>
           </a:xfrm>
           <a:prstGeom prst="rect">
@@ -16532,6 +16670,571 @@
               </a:rPr>
               <a:t>?</a:t>
             </a:r>
+          </a:p>
+        </p:txBody>
+      </p:sp>
+      <p:sp>
+        <p:nvSpPr>
+          <p:cNvPr id="6" name="Rectangle 1">
+            <a:extLst>
+              <a:ext uri="{FF2B5EF4-FFF2-40B4-BE49-F238E27FC236}">
+                <a16:creationId xmlns:a16="http://schemas.microsoft.com/office/drawing/2014/main" id="{FEC1F67F-5D35-4EF9-81BC-2DE8A0D6B053}"/>
+              </a:ext>
+            </a:extLst>
+          </p:cNvPr>
+          <p:cNvSpPr>
+            <a:spLocks noChangeArrowheads="1"/>
+          </p:cNvSpPr>
+          <p:nvPr/>
+        </p:nvSpPr>
+        <p:spPr bwMode="auto">
+          <a:xfrm>
+            <a:off x="8210268" y="1622565"/>
+            <a:ext cx="3754753" cy="3231654"/>
+          </a:xfrm>
+          <a:prstGeom prst="rect">
+            <a:avLst/>
+          </a:prstGeom>
+          <a:solidFill>
+            <a:srgbClr val="FFFFFF"/>
+          </a:solidFill>
+          <a:ln>
+            <a:noFill/>
+          </a:ln>
+          <a:effectLst/>
+          <a:extLst>
+            <a:ext uri="{91240B29-F687-4F45-9708-019B960494DF}">
+              <a14:hiddenLine xmlns:a14="http://schemas.microsoft.com/office/drawing/2010/main" w="9525">
+                <a:solidFill>
+                  <a:schemeClr val="tx1"/>
+                </a:solidFill>
+                <a:miter lim="800000"/>
+                <a:headEnd/>
+                <a:tailEnd/>
+              </a14:hiddenLine>
+            </a:ext>
+            <a:ext uri="{AF507438-7753-43E0-B8FC-AC1667EBCBE1}">
+              <a14:hiddenEffects xmlns:a14="http://schemas.microsoft.com/office/drawing/2010/main">
+                <a:effectLst>
+                  <a:outerShdw dist="35921" dir="2700000" algn="ctr" rotWithShape="0">
+                    <a:schemeClr val="bg2"/>
+                  </a:outerShdw>
+                </a:effectLst>
+              </a14:hiddenEffects>
+            </a:ext>
+          </a:extLst>
+        </p:spPr>
+        <p:txBody>
+          <a:bodyPr vert="horz" wrap="square" lIns="0" tIns="0" rIns="0" bIns="0" numCol="1" anchor="ctr" anchorCtr="0" compatLnSpc="1">
+            <a:prstTxWarp prst="textNoShape">
+              <a:avLst/>
+            </a:prstTxWarp>
+            <a:spAutoFit/>
+          </a:bodyPr>
+          <a:lstStyle/>
+          <a:p>
+            <a:pPr lvl="0" eaLnBrk="0" fontAlgn="base" hangingPunct="0">
+              <a:spcBef>
+                <a:spcPct val="0"/>
+              </a:spcBef>
+              <a:spcAft>
+                <a:spcPct val="0"/>
+              </a:spcAft>
+            </a:pPr>
+            <a:r>
+              <a:rPr lang="en-US" altLang="en-US" sz="1000" dirty="0">
+                <a:latin typeface="Arial" panose="020B0604020202020204" pitchFamily="34" charset="0"/>
+              </a:rPr>
+              <a:t> fieldres.man2&lt;-</a:t>
+            </a:r>
+            <a:r>
+              <a:rPr lang="en-US" altLang="en-US" sz="1000" dirty="0" err="1">
+                <a:latin typeface="Arial" panose="020B0604020202020204" pitchFamily="34" charset="0"/>
+              </a:rPr>
+              <a:t>manova</a:t>
+            </a:r>
+            <a:r>
+              <a:rPr lang="en-US" altLang="en-US" sz="1000" dirty="0">
+                <a:latin typeface="Arial" panose="020B0604020202020204" pitchFamily="34" charset="0"/>
+              </a:rPr>
+              <a:t>(</a:t>
+            </a:r>
+            <a:r>
+              <a:rPr lang="en-US" altLang="en-US" sz="1000" dirty="0" err="1">
+                <a:latin typeface="Arial" panose="020B0604020202020204" pitchFamily="34" charset="0"/>
+              </a:rPr>
+              <a:t>cbind</a:t>
+            </a:r>
+            <a:r>
+              <a:rPr lang="en-US" altLang="en-US" sz="1000" dirty="0">
+                <a:latin typeface="Arial" panose="020B0604020202020204" pitchFamily="34" charset="0"/>
+              </a:rPr>
+              <a:t>(</a:t>
+            </a:r>
+            <a:r>
+              <a:rPr lang="en-US" altLang="en-US" sz="1000" dirty="0" err="1">
+                <a:latin typeface="Arial" panose="020B0604020202020204" pitchFamily="34" charset="0"/>
+              </a:rPr>
+              <a:t>length.mm,CS</a:t>
+            </a:r>
+            <a:r>
+              <a:rPr lang="en-US" altLang="en-US" sz="1000" dirty="0">
+                <a:latin typeface="Arial" panose="020B0604020202020204" pitchFamily="34" charset="0"/>
+              </a:rPr>
+              <a:t>)~Biome*Latitude, data-</a:t>
+            </a:r>
+            <a:r>
+              <a:rPr lang="en-US" altLang="en-US" sz="1000" dirty="0" err="1">
+                <a:latin typeface="Arial" panose="020B0604020202020204" pitchFamily="34" charset="0"/>
+              </a:rPr>
+              <a:t>fwing</a:t>
+            </a:r>
+            <a:r>
+              <a:rPr lang="en-US" altLang="en-US" sz="1000" dirty="0">
+                <a:latin typeface="Arial" panose="020B0604020202020204" pitchFamily="34" charset="0"/>
+              </a:rPr>
+              <a:t>)</a:t>
+            </a:r>
+          </a:p>
+          <a:p>
+            <a:pPr lvl="0" eaLnBrk="0" fontAlgn="base" hangingPunct="0">
+              <a:spcBef>
+                <a:spcPct val="0"/>
+              </a:spcBef>
+              <a:spcAft>
+                <a:spcPct val="0"/>
+              </a:spcAft>
+            </a:pPr>
+            <a:endParaRPr lang="en-US" altLang="en-US" sz="1000" dirty="0">
+              <a:latin typeface="Arial" panose="020B0604020202020204" pitchFamily="34" charset="0"/>
+            </a:endParaRPr>
+          </a:p>
+          <a:p>
+            <a:pPr lvl="0" eaLnBrk="0" fontAlgn="base" hangingPunct="0">
+              <a:spcBef>
+                <a:spcPct val="0"/>
+              </a:spcBef>
+              <a:spcAft>
+                <a:spcPct val="0"/>
+              </a:spcAft>
+            </a:pPr>
+            <a:r>
+              <a:rPr lang="en-US" altLang="en-US" sz="1000" dirty="0" err="1">
+                <a:latin typeface="Arial" panose="020B0604020202020204" pitchFamily="34" charset="0"/>
+              </a:rPr>
+              <a:t>summary.aov</a:t>
+            </a:r>
+            <a:r>
+              <a:rPr lang="en-US" altLang="en-US" sz="1000" dirty="0">
+                <a:latin typeface="Arial" panose="020B0604020202020204" pitchFamily="34" charset="0"/>
+              </a:rPr>
+              <a:t>(fieldres.man2)</a:t>
+            </a:r>
+          </a:p>
+          <a:p>
+            <a:pPr lvl="0" eaLnBrk="0" fontAlgn="base" hangingPunct="0">
+              <a:spcBef>
+                <a:spcPct val="0"/>
+              </a:spcBef>
+              <a:spcAft>
+                <a:spcPct val="0"/>
+              </a:spcAft>
+            </a:pPr>
+            <a:r>
+              <a:rPr lang="en-US" altLang="en-US" sz="1000" dirty="0">
+                <a:latin typeface="Arial" panose="020B0604020202020204" pitchFamily="34" charset="0"/>
+              </a:rPr>
+              <a:t> Response Length.mm :</a:t>
+            </a:r>
+          </a:p>
+          <a:p>
+            <a:pPr lvl="0" eaLnBrk="0" fontAlgn="base" hangingPunct="0">
+              <a:spcBef>
+                <a:spcPct val="0"/>
+              </a:spcBef>
+              <a:spcAft>
+                <a:spcPct val="0"/>
+              </a:spcAft>
+            </a:pPr>
+            <a:r>
+              <a:rPr lang="en-US" altLang="en-US" sz="1000" dirty="0">
+                <a:latin typeface="Arial" panose="020B0604020202020204" pitchFamily="34" charset="0"/>
+              </a:rPr>
+              <a:t>                </a:t>
+            </a:r>
+            <a:r>
+              <a:rPr lang="en-US" altLang="en-US" sz="1000" dirty="0" err="1">
+                <a:latin typeface="Arial" panose="020B0604020202020204" pitchFamily="34" charset="0"/>
+              </a:rPr>
+              <a:t>Df</a:t>
+            </a:r>
+            <a:r>
+              <a:rPr lang="en-US" altLang="en-US" sz="1000" dirty="0">
+                <a:latin typeface="Arial" panose="020B0604020202020204" pitchFamily="34" charset="0"/>
+              </a:rPr>
+              <a:t> Sum </a:t>
+            </a:r>
+            <a:r>
+              <a:rPr lang="en-US" altLang="en-US" sz="1000" dirty="0" err="1">
+                <a:latin typeface="Arial" panose="020B0604020202020204" pitchFamily="34" charset="0"/>
+              </a:rPr>
+              <a:t>Sq</a:t>
+            </a:r>
+            <a:r>
+              <a:rPr lang="en-US" altLang="en-US" sz="1000" dirty="0">
+                <a:latin typeface="Arial" panose="020B0604020202020204" pitchFamily="34" charset="0"/>
+              </a:rPr>
+              <a:t> Mean </a:t>
+            </a:r>
+            <a:r>
+              <a:rPr lang="en-US" altLang="en-US" sz="1000" dirty="0" err="1">
+                <a:latin typeface="Arial" panose="020B0604020202020204" pitchFamily="34" charset="0"/>
+              </a:rPr>
+              <a:t>Sq</a:t>
+            </a:r>
+            <a:r>
+              <a:rPr lang="en-US" altLang="en-US" sz="1000" dirty="0">
+                <a:latin typeface="Arial" panose="020B0604020202020204" pitchFamily="34" charset="0"/>
+              </a:rPr>
+              <a:t> F value </a:t>
+            </a:r>
+            <a:r>
+              <a:rPr lang="en-US" altLang="en-US" sz="1000" dirty="0" err="1">
+                <a:latin typeface="Arial" panose="020B0604020202020204" pitchFamily="34" charset="0"/>
+              </a:rPr>
+              <a:t>Pr</a:t>
+            </a:r>
+            <a:r>
+              <a:rPr lang="en-US" altLang="en-US" sz="1000" dirty="0">
+                <a:latin typeface="Arial" panose="020B0604020202020204" pitchFamily="34" charset="0"/>
+              </a:rPr>
+              <a:t>(&gt;F)    </a:t>
+            </a:r>
+          </a:p>
+          <a:p>
+            <a:pPr lvl="0" eaLnBrk="0" fontAlgn="base" hangingPunct="0">
+              <a:spcBef>
+                <a:spcPct val="0"/>
+              </a:spcBef>
+              <a:spcAft>
+                <a:spcPct val="0"/>
+              </a:spcAft>
+            </a:pPr>
+            <a:r>
+              <a:rPr lang="en-US" altLang="en-US" sz="1000" dirty="0">
+                <a:highlight>
+                  <a:srgbClr val="00FFFF"/>
+                </a:highlight>
+                <a:latin typeface="Arial" panose="020B0604020202020204" pitchFamily="34" charset="0"/>
+              </a:rPr>
+              <a:t>Biome            2 3.0569 1.52844 49.6074 &lt;2e-16 ***</a:t>
+            </a:r>
+          </a:p>
+          <a:p>
+            <a:pPr lvl="0" eaLnBrk="0" fontAlgn="base" hangingPunct="0">
+              <a:spcBef>
+                <a:spcPct val="0"/>
+              </a:spcBef>
+              <a:spcAft>
+                <a:spcPct val="0"/>
+              </a:spcAft>
+            </a:pPr>
+            <a:r>
+              <a:rPr lang="en-US" altLang="en-US" sz="1000" dirty="0">
+                <a:latin typeface="Arial" panose="020B0604020202020204" pitchFamily="34" charset="0"/>
+              </a:rPr>
+              <a:t>Latitude         1 0.0330 0.03296  1.0697 0.3021    </a:t>
+            </a:r>
+          </a:p>
+          <a:p>
+            <a:pPr lvl="0" eaLnBrk="0" fontAlgn="base" hangingPunct="0">
+              <a:spcBef>
+                <a:spcPct val="0"/>
+              </a:spcBef>
+              <a:spcAft>
+                <a:spcPct val="0"/>
+              </a:spcAft>
+            </a:pPr>
+            <a:r>
+              <a:rPr lang="en-US" altLang="en-US" sz="1000" dirty="0" err="1">
+                <a:latin typeface="Arial" panose="020B0604020202020204" pitchFamily="34" charset="0"/>
+              </a:rPr>
+              <a:t>Biome:Latitude</a:t>
+            </a:r>
+            <a:r>
+              <a:rPr lang="en-US" altLang="en-US" sz="1000" dirty="0">
+                <a:latin typeface="Arial" panose="020B0604020202020204" pitchFamily="34" charset="0"/>
+              </a:rPr>
+              <a:t>   1 0.0305 0.03052  0.9905 0.3206    </a:t>
+            </a:r>
+          </a:p>
+          <a:p>
+            <a:pPr lvl="0" eaLnBrk="0" fontAlgn="base" hangingPunct="0">
+              <a:spcBef>
+                <a:spcPct val="0"/>
+              </a:spcBef>
+              <a:spcAft>
+                <a:spcPct val="0"/>
+              </a:spcAft>
+            </a:pPr>
+            <a:r>
+              <a:rPr lang="en-US" altLang="en-US" sz="1000" dirty="0">
+                <a:latin typeface="Arial" panose="020B0604020202020204" pitchFamily="34" charset="0"/>
+              </a:rPr>
+              <a:t>Residuals      236 7.2713 0.03081                   </a:t>
+            </a:r>
+          </a:p>
+          <a:p>
+            <a:pPr lvl="0" eaLnBrk="0" fontAlgn="base" hangingPunct="0">
+              <a:spcBef>
+                <a:spcPct val="0"/>
+              </a:spcBef>
+              <a:spcAft>
+                <a:spcPct val="0"/>
+              </a:spcAft>
+            </a:pPr>
+            <a:r>
+              <a:rPr lang="en-US" altLang="en-US" sz="1000" dirty="0">
+                <a:latin typeface="Arial" panose="020B0604020202020204" pitchFamily="34" charset="0"/>
+              </a:rPr>
+              <a:t>---</a:t>
+            </a:r>
+          </a:p>
+          <a:p>
+            <a:pPr lvl="0" eaLnBrk="0" fontAlgn="base" hangingPunct="0">
+              <a:spcBef>
+                <a:spcPct val="0"/>
+              </a:spcBef>
+              <a:spcAft>
+                <a:spcPct val="0"/>
+              </a:spcAft>
+            </a:pPr>
+            <a:r>
+              <a:rPr lang="en-US" altLang="en-US" sz="1000" dirty="0" err="1">
+                <a:latin typeface="Arial" panose="020B0604020202020204" pitchFamily="34" charset="0"/>
+              </a:rPr>
+              <a:t>Signif</a:t>
+            </a:r>
+            <a:r>
+              <a:rPr lang="en-US" altLang="en-US" sz="1000" dirty="0">
+                <a:latin typeface="Arial" panose="020B0604020202020204" pitchFamily="34" charset="0"/>
+              </a:rPr>
+              <a:t>. codes:  0 ‘***’ 0.001 ‘**’ 0.01 ‘*’ 0.05 ‘.’ 0.1 ‘ ’ 1</a:t>
+            </a:r>
+          </a:p>
+          <a:p>
+            <a:pPr lvl="0" eaLnBrk="0" fontAlgn="base" hangingPunct="0">
+              <a:spcBef>
+                <a:spcPct val="0"/>
+              </a:spcBef>
+              <a:spcAft>
+                <a:spcPct val="0"/>
+              </a:spcAft>
+            </a:pPr>
+            <a:endParaRPr lang="en-US" altLang="en-US" sz="1000" dirty="0">
+              <a:latin typeface="Arial" panose="020B0604020202020204" pitchFamily="34" charset="0"/>
+            </a:endParaRPr>
+          </a:p>
+          <a:p>
+            <a:pPr lvl="0" eaLnBrk="0" fontAlgn="base" hangingPunct="0">
+              <a:spcBef>
+                <a:spcPct val="0"/>
+              </a:spcBef>
+              <a:spcAft>
+                <a:spcPct val="0"/>
+              </a:spcAft>
+            </a:pPr>
+            <a:r>
+              <a:rPr lang="en-US" altLang="en-US" sz="1000" dirty="0">
+                <a:latin typeface="Arial" panose="020B0604020202020204" pitchFamily="34" charset="0"/>
+              </a:rPr>
+              <a:t> Response CS :</a:t>
+            </a:r>
+          </a:p>
+          <a:p>
+            <a:pPr lvl="0" eaLnBrk="0" fontAlgn="base" hangingPunct="0">
+              <a:spcBef>
+                <a:spcPct val="0"/>
+              </a:spcBef>
+              <a:spcAft>
+                <a:spcPct val="0"/>
+              </a:spcAft>
+            </a:pPr>
+            <a:r>
+              <a:rPr lang="en-US" altLang="en-US" sz="1000" dirty="0">
+                <a:latin typeface="Arial" panose="020B0604020202020204" pitchFamily="34" charset="0"/>
+              </a:rPr>
+              <a:t>                </a:t>
+            </a:r>
+            <a:r>
+              <a:rPr lang="en-US" altLang="en-US" sz="1000" dirty="0" err="1">
+                <a:latin typeface="Arial" panose="020B0604020202020204" pitchFamily="34" charset="0"/>
+              </a:rPr>
+              <a:t>Df</a:t>
+            </a:r>
+            <a:r>
+              <a:rPr lang="en-US" altLang="en-US" sz="1000" dirty="0">
+                <a:latin typeface="Arial" panose="020B0604020202020204" pitchFamily="34" charset="0"/>
+              </a:rPr>
+              <a:t> Sum </a:t>
+            </a:r>
+            <a:r>
+              <a:rPr lang="en-US" altLang="en-US" sz="1000" dirty="0" err="1">
+                <a:latin typeface="Arial" panose="020B0604020202020204" pitchFamily="34" charset="0"/>
+              </a:rPr>
+              <a:t>Sq</a:t>
+            </a:r>
+            <a:r>
+              <a:rPr lang="en-US" altLang="en-US" sz="1000" dirty="0">
+                <a:latin typeface="Arial" panose="020B0604020202020204" pitchFamily="34" charset="0"/>
+              </a:rPr>
+              <a:t> Mean </a:t>
+            </a:r>
+            <a:r>
+              <a:rPr lang="en-US" altLang="en-US" sz="1000" dirty="0" err="1">
+                <a:latin typeface="Arial" panose="020B0604020202020204" pitchFamily="34" charset="0"/>
+              </a:rPr>
+              <a:t>Sq</a:t>
+            </a:r>
+            <a:r>
+              <a:rPr lang="en-US" altLang="en-US" sz="1000" dirty="0">
+                <a:latin typeface="Arial" panose="020B0604020202020204" pitchFamily="34" charset="0"/>
+              </a:rPr>
+              <a:t> F value  </a:t>
+            </a:r>
+            <a:r>
+              <a:rPr lang="en-US" altLang="en-US" sz="1000" dirty="0" err="1">
+                <a:latin typeface="Arial" panose="020B0604020202020204" pitchFamily="34" charset="0"/>
+              </a:rPr>
+              <a:t>Pr</a:t>
+            </a:r>
+            <a:r>
+              <a:rPr lang="en-US" altLang="en-US" sz="1000" dirty="0">
+                <a:latin typeface="Arial" panose="020B0604020202020204" pitchFamily="34" charset="0"/>
+              </a:rPr>
+              <a:t>(&gt;F)    </a:t>
+            </a:r>
+          </a:p>
+          <a:p>
+            <a:pPr lvl="0" eaLnBrk="0" fontAlgn="base" hangingPunct="0">
+              <a:spcBef>
+                <a:spcPct val="0"/>
+              </a:spcBef>
+              <a:spcAft>
+                <a:spcPct val="0"/>
+              </a:spcAft>
+            </a:pPr>
+            <a:r>
+              <a:rPr lang="en-US" altLang="en-US" sz="1000" dirty="0">
+                <a:highlight>
+                  <a:srgbClr val="00FFFF"/>
+                </a:highlight>
+                <a:latin typeface="Arial" panose="020B0604020202020204" pitchFamily="34" charset="0"/>
+              </a:rPr>
+              <a:t>Biome            2 2.7879 1.39395 52.3396 &lt; 2e-16 ***</a:t>
+            </a:r>
+          </a:p>
+          <a:p>
+            <a:pPr lvl="0" eaLnBrk="0" fontAlgn="base" hangingPunct="0">
+              <a:spcBef>
+                <a:spcPct val="0"/>
+              </a:spcBef>
+              <a:spcAft>
+                <a:spcPct val="0"/>
+              </a:spcAft>
+            </a:pPr>
+            <a:r>
+              <a:rPr lang="en-US" altLang="en-US" sz="1000" dirty="0">
+                <a:latin typeface="Arial" panose="020B0604020202020204" pitchFamily="34" charset="0"/>
+              </a:rPr>
+              <a:t>Latitude         1 0.0935 0.09355  3.5125 0.06214 .  </a:t>
+            </a:r>
+          </a:p>
+          <a:p>
+            <a:pPr lvl="0" eaLnBrk="0" fontAlgn="base" hangingPunct="0">
+              <a:spcBef>
+                <a:spcPct val="0"/>
+              </a:spcBef>
+              <a:spcAft>
+                <a:spcPct val="0"/>
+              </a:spcAft>
+            </a:pPr>
+            <a:r>
+              <a:rPr lang="en-US" altLang="en-US" sz="1000" dirty="0" err="1">
+                <a:latin typeface="Arial" panose="020B0604020202020204" pitchFamily="34" charset="0"/>
+              </a:rPr>
+              <a:t>Biome:Latitude</a:t>
+            </a:r>
+            <a:r>
+              <a:rPr lang="en-US" altLang="en-US" sz="1000" dirty="0">
+                <a:latin typeface="Arial" panose="020B0604020202020204" pitchFamily="34" charset="0"/>
+              </a:rPr>
+              <a:t>   1 0.0043 0.00427  0.1604 0.68919    </a:t>
+            </a:r>
+          </a:p>
+          <a:p>
+            <a:pPr lvl="0" eaLnBrk="0" fontAlgn="base" hangingPunct="0">
+              <a:spcBef>
+                <a:spcPct val="0"/>
+              </a:spcBef>
+              <a:spcAft>
+                <a:spcPct val="0"/>
+              </a:spcAft>
+            </a:pPr>
+            <a:r>
+              <a:rPr lang="en-US" altLang="en-US" sz="1000" dirty="0">
+                <a:latin typeface="Arial" panose="020B0604020202020204" pitchFamily="34" charset="0"/>
+              </a:rPr>
+              <a:t>Residuals      236 6.2853 0.02663                    </a:t>
+            </a:r>
+          </a:p>
+          <a:p>
+            <a:pPr lvl="0" eaLnBrk="0" fontAlgn="base" hangingPunct="0">
+              <a:spcBef>
+                <a:spcPct val="0"/>
+              </a:spcBef>
+              <a:spcAft>
+                <a:spcPct val="0"/>
+              </a:spcAft>
+            </a:pPr>
+            <a:r>
+              <a:rPr lang="en-US" altLang="en-US" sz="1000" dirty="0">
+                <a:latin typeface="Arial" panose="020B0604020202020204" pitchFamily="34" charset="0"/>
+              </a:rPr>
+              <a:t>---</a:t>
+            </a:r>
+          </a:p>
+          <a:p>
+            <a:pPr lvl="0" eaLnBrk="0" fontAlgn="base" hangingPunct="0">
+              <a:spcBef>
+                <a:spcPct val="0"/>
+              </a:spcBef>
+              <a:spcAft>
+                <a:spcPct val="0"/>
+              </a:spcAft>
+            </a:pPr>
+            <a:r>
+              <a:rPr lang="en-US" altLang="en-US" sz="1000" dirty="0" err="1">
+                <a:latin typeface="Arial" panose="020B0604020202020204" pitchFamily="34" charset="0"/>
+              </a:rPr>
+              <a:t>Signif</a:t>
+            </a:r>
+            <a:r>
+              <a:rPr lang="en-US" altLang="en-US" sz="1000" dirty="0">
+                <a:latin typeface="Arial" panose="020B0604020202020204" pitchFamily="34" charset="0"/>
+              </a:rPr>
+              <a:t>. codes:  0 ‘***’ 0.001 ‘**’ 0.01 ‘*’ 0.05 ‘.’ 0.1 ‘ ’ 1</a:t>
+            </a:r>
+            <a:endParaRPr kumimoji="0" lang="en-US" altLang="en-US" sz="1000" b="0" i="0" u="none" strike="noStrike" cap="none" normalizeH="0" baseline="0" dirty="0">
+              <a:ln>
+                <a:noFill/>
+              </a:ln>
+              <a:solidFill>
+                <a:schemeClr val="tx1"/>
+              </a:solidFill>
+              <a:effectLst/>
+              <a:latin typeface="Arial" panose="020B0604020202020204" pitchFamily="34" charset="0"/>
+            </a:endParaRPr>
           </a:p>
         </p:txBody>
       </p:sp>
@@ -16932,6 +17635,380 @@
     <p:extLst>
       <p:ext uri="{BB962C8B-B14F-4D97-AF65-F5344CB8AC3E}">
         <p14:creationId xmlns:p14="http://schemas.microsoft.com/office/powerpoint/2010/main" val="1621652750"/>
+      </p:ext>
+    </p:extLst>
+  </p:cSld>
+  <p:clrMapOvr>
+    <a:masterClrMapping/>
+  </p:clrMapOvr>
+</p:sld>
+</file>
+
+<file path=ppt/slides/slide20.xml><?xml version="1.0" encoding="utf-8"?>
+<p:sld xmlns:a="http://schemas.openxmlformats.org/drawingml/2006/main" xmlns:r="http://schemas.openxmlformats.org/officeDocument/2006/relationships" xmlns:p="http://schemas.openxmlformats.org/presentationml/2006/main">
+  <p:cSld>
+    <p:spTree>
+      <p:nvGrpSpPr>
+        <p:cNvPr id="1" name=""/>
+        <p:cNvGrpSpPr/>
+        <p:nvPr/>
+      </p:nvGrpSpPr>
+      <p:grpSpPr>
+        <a:xfrm>
+          <a:off x="0" y="0"/>
+          <a:ext cx="0" cy="0"/>
+          <a:chOff x="0" y="0"/>
+          <a:chExt cx="0" cy="0"/>
+        </a:xfrm>
+      </p:grpSpPr>
+      <p:sp>
+        <p:nvSpPr>
+          <p:cNvPr id="2" name="Title 1">
+            <a:extLst>
+              <a:ext uri="{FF2B5EF4-FFF2-40B4-BE49-F238E27FC236}">
+                <a16:creationId xmlns:a16="http://schemas.microsoft.com/office/drawing/2014/main" id="{820588EE-7CF1-4E50-AB82-528A0D0FA10C}"/>
+              </a:ext>
+            </a:extLst>
+          </p:cNvPr>
+          <p:cNvSpPr>
+            <a:spLocks noGrp="1"/>
+          </p:cNvSpPr>
+          <p:nvPr>
+            <p:ph type="title"/>
+          </p:nvPr>
+        </p:nvSpPr>
+        <p:spPr/>
+        <p:txBody>
+          <a:bodyPr/>
+          <a:lstStyle/>
+          <a:p>
+            <a:r>
+              <a:rPr lang="en-US" dirty="0"/>
+              <a:t>MANOVA summary CS/Wing length	</a:t>
+            </a:r>
+          </a:p>
+        </p:txBody>
+      </p:sp>
+      <p:sp>
+        <p:nvSpPr>
+          <p:cNvPr id="3" name="Content Placeholder 2">
+            <a:extLst>
+              <a:ext uri="{FF2B5EF4-FFF2-40B4-BE49-F238E27FC236}">
+                <a16:creationId xmlns:a16="http://schemas.microsoft.com/office/drawing/2014/main" id="{629AC425-6420-4CFB-BB33-41402A5E43B4}"/>
+              </a:ext>
+            </a:extLst>
+          </p:cNvPr>
+          <p:cNvSpPr>
+            <a:spLocks noGrp="1"/>
+          </p:cNvSpPr>
+          <p:nvPr>
+            <p:ph idx="1"/>
+          </p:nvPr>
+        </p:nvSpPr>
+        <p:spPr/>
+        <p:txBody>
+          <a:bodyPr/>
+          <a:lstStyle/>
+          <a:p>
+            <a:r>
+              <a:rPr lang="en-US" dirty="0"/>
+              <a:t>MANOVA results support factorial ANOVA results in comparing Biome and latitude/locality on wing length and cs.</a:t>
+            </a:r>
+          </a:p>
+          <a:p>
+            <a:pPr lvl="1"/>
+            <a:r>
+              <a:rPr lang="en-US" dirty="0"/>
+              <a:t>Independently, they are each significant on both wing length and CS. But when combined, only biome alone is significant (p&lt;2e-16) whereas latitude and their interactions are not</a:t>
+            </a:r>
+          </a:p>
+        </p:txBody>
+      </p:sp>
+    </p:spTree>
+    <p:extLst>
+      <p:ext uri="{BB962C8B-B14F-4D97-AF65-F5344CB8AC3E}">
+        <p14:creationId xmlns:p14="http://schemas.microsoft.com/office/powerpoint/2010/main" val="1667494089"/>
+      </p:ext>
+    </p:extLst>
+  </p:cSld>
+  <p:clrMapOvr>
+    <a:masterClrMapping/>
+  </p:clrMapOvr>
+</p:sld>
+</file>
+
+<file path=ppt/slides/slide21.xml><?xml version="1.0" encoding="utf-8"?>
+<p:sld xmlns:a="http://schemas.openxmlformats.org/drawingml/2006/main" xmlns:r="http://schemas.openxmlformats.org/officeDocument/2006/relationships" xmlns:p="http://schemas.openxmlformats.org/presentationml/2006/main">
+  <p:cSld>
+    <p:spTree>
+      <p:nvGrpSpPr>
+        <p:cNvPr id="1" name=""/>
+        <p:cNvGrpSpPr/>
+        <p:nvPr/>
+      </p:nvGrpSpPr>
+      <p:grpSpPr>
+        <a:xfrm>
+          <a:off x="0" y="0"/>
+          <a:ext cx="0" cy="0"/>
+          <a:chOff x="0" y="0"/>
+          <a:chExt cx="0" cy="0"/>
+        </a:xfrm>
+      </p:grpSpPr>
+      <p:sp>
+        <p:nvSpPr>
+          <p:cNvPr id="2" name="Title 1">
+            <a:extLst>
+              <a:ext uri="{FF2B5EF4-FFF2-40B4-BE49-F238E27FC236}">
+                <a16:creationId xmlns:a16="http://schemas.microsoft.com/office/drawing/2014/main" id="{A697BF62-1210-4732-B798-3137F531F7F0}"/>
+              </a:ext>
+            </a:extLst>
+          </p:cNvPr>
+          <p:cNvSpPr>
+            <a:spLocks noGrp="1"/>
+          </p:cNvSpPr>
+          <p:nvPr>
+            <p:ph type="title"/>
+          </p:nvPr>
+        </p:nvSpPr>
+        <p:spPr/>
+        <p:txBody>
+          <a:bodyPr/>
+          <a:lstStyle/>
+          <a:p>
+            <a:r>
+              <a:rPr lang="en-US" dirty="0"/>
+              <a:t>MANOVA on wing shape</a:t>
+            </a:r>
+          </a:p>
+        </p:txBody>
+      </p:sp>
+      <p:sp>
+        <p:nvSpPr>
+          <p:cNvPr id="3" name="Content Placeholder 2">
+            <a:extLst>
+              <a:ext uri="{FF2B5EF4-FFF2-40B4-BE49-F238E27FC236}">
+                <a16:creationId xmlns:a16="http://schemas.microsoft.com/office/drawing/2014/main" id="{49BC967D-8F5C-472A-A2D3-235B6C3AAA5B}"/>
+              </a:ext>
+            </a:extLst>
+          </p:cNvPr>
+          <p:cNvSpPr>
+            <a:spLocks noGrp="1"/>
+          </p:cNvSpPr>
+          <p:nvPr>
+            <p:ph idx="1"/>
+          </p:nvPr>
+        </p:nvSpPr>
+        <p:spPr>
+          <a:xfrm>
+            <a:off x="838200" y="1825625"/>
+            <a:ext cx="10515600" cy="4351338"/>
+          </a:xfrm>
+        </p:spPr>
+        <p:txBody>
+          <a:bodyPr/>
+          <a:lstStyle/>
+          <a:p>
+            <a:r>
+              <a:rPr lang="en-US" dirty="0"/>
+              <a:t>Turned partial warps of 18 landmarks into matrix in R</a:t>
+            </a:r>
+          </a:p>
+          <a:p>
+            <a:r>
+              <a:rPr lang="en-US" dirty="0"/>
+              <a:t>Looks like both biome and locality are significant</a:t>
+            </a:r>
+          </a:p>
+          <a:p>
+            <a:r>
+              <a:rPr lang="en-US" dirty="0">
+                <a:solidFill>
+                  <a:srgbClr val="7030A0"/>
+                </a:solidFill>
+              </a:rPr>
+              <a:t>I have STATA- how would you do this analysis in STATA?</a:t>
+            </a:r>
+          </a:p>
+          <a:p>
+            <a:endParaRPr lang="en-US" dirty="0"/>
+          </a:p>
+        </p:txBody>
+      </p:sp>
+      <p:sp>
+        <p:nvSpPr>
+          <p:cNvPr id="4" name="TextBox 3">
+            <a:extLst>
+              <a:ext uri="{FF2B5EF4-FFF2-40B4-BE49-F238E27FC236}">
+                <a16:creationId xmlns:a16="http://schemas.microsoft.com/office/drawing/2014/main" id="{A2AB0501-EEDD-4E9D-B4B7-D23E16072F2E}"/>
+              </a:ext>
+            </a:extLst>
+          </p:cNvPr>
+          <p:cNvSpPr txBox="1"/>
+          <p:nvPr/>
+        </p:nvSpPr>
+        <p:spPr>
+          <a:xfrm>
+            <a:off x="4771418" y="3766243"/>
+            <a:ext cx="8216630" cy="2585323"/>
+          </a:xfrm>
+          <a:prstGeom prst="rect">
+            <a:avLst/>
+          </a:prstGeom>
+          <a:noFill/>
+        </p:spPr>
+        <p:txBody>
+          <a:bodyPr wrap="square" rtlCol="0">
+            <a:spAutoFit/>
+          </a:bodyPr>
+          <a:lstStyle/>
+          <a:p>
+            <a:r>
+              <a:rPr lang="en-US" dirty="0"/>
+              <a:t>fman1&lt;-</a:t>
+            </a:r>
+            <a:r>
+              <a:rPr lang="en-US" dirty="0" err="1"/>
+              <a:t>manova</a:t>
+            </a:r>
+            <a:r>
+              <a:rPr lang="en-US" dirty="0"/>
+              <a:t>(</a:t>
+            </a:r>
+            <a:r>
+              <a:rPr lang="en-US" dirty="0" err="1"/>
+              <a:t>f_pw_mat~fwing$Biome</a:t>
+            </a:r>
+            <a:r>
+              <a:rPr lang="en-US" dirty="0"/>
+              <a:t>*</a:t>
+            </a:r>
+            <a:r>
+              <a:rPr lang="en-US" dirty="0" err="1"/>
+              <a:t>fwing$Latitude</a:t>
+            </a:r>
+            <a:r>
+              <a:rPr lang="en-US" dirty="0"/>
+              <a:t>)</a:t>
+            </a:r>
+          </a:p>
+          <a:p>
+            <a:r>
+              <a:rPr lang="en-US" dirty="0"/>
+              <a:t>&gt; summary(fman1, test="Wilks")</a:t>
+            </a:r>
+          </a:p>
+          <a:p>
+            <a:r>
+              <a:rPr lang="en-US" dirty="0"/>
+              <a:t>                            </a:t>
+            </a:r>
+            <a:r>
+              <a:rPr lang="en-US" dirty="0" err="1"/>
+              <a:t>Df</a:t>
+            </a:r>
+            <a:r>
+              <a:rPr lang="en-US" dirty="0"/>
+              <a:t>   Wilks </a:t>
+            </a:r>
+            <a:r>
+              <a:rPr lang="en-US" dirty="0" err="1"/>
+              <a:t>approx</a:t>
+            </a:r>
+            <a:r>
+              <a:rPr lang="en-US" dirty="0"/>
+              <a:t> F </a:t>
+            </a:r>
+            <a:r>
+              <a:rPr lang="en-US" dirty="0" err="1"/>
+              <a:t>num</a:t>
+            </a:r>
+            <a:r>
+              <a:rPr lang="en-US" dirty="0"/>
+              <a:t> </a:t>
+            </a:r>
+            <a:r>
+              <a:rPr lang="en-US" dirty="0" err="1"/>
+              <a:t>Df</a:t>
+            </a:r>
+            <a:r>
+              <a:rPr lang="en-US" dirty="0"/>
+              <a:t> den </a:t>
+            </a:r>
+            <a:r>
+              <a:rPr lang="en-US" dirty="0" err="1"/>
+              <a:t>Df</a:t>
+            </a:r>
+            <a:r>
+              <a:rPr lang="en-US" dirty="0"/>
+              <a:t>    </a:t>
+            </a:r>
+            <a:r>
+              <a:rPr lang="en-US" dirty="0" err="1"/>
+              <a:t>Pr</a:t>
+            </a:r>
+            <a:r>
+              <a:rPr lang="en-US" dirty="0"/>
+              <a:t>(&gt;F)    </a:t>
+            </a:r>
+          </a:p>
+          <a:p>
+            <a:r>
+              <a:rPr lang="en-US" dirty="0" err="1"/>
+              <a:t>fwing$Biome</a:t>
+            </a:r>
+            <a:r>
+              <a:rPr lang="en-US" dirty="0"/>
+              <a:t>                  2 0.31848   4.9454     64    410 &lt; 2.2e-16 ***</a:t>
+            </a:r>
+          </a:p>
+          <a:p>
+            <a:r>
+              <a:rPr lang="en-US" dirty="0" err="1"/>
+              <a:t>fwing$Latitude</a:t>
+            </a:r>
+            <a:r>
+              <a:rPr lang="en-US" dirty="0"/>
+              <a:t>               1 0.63871   3.6237     32    205 1.162e-08 ***</a:t>
+            </a:r>
+          </a:p>
+          <a:p>
+            <a:r>
+              <a:rPr lang="en-US" dirty="0" err="1"/>
+              <a:t>fwing$Biome:fwing$Latitude</a:t>
+            </a:r>
+            <a:r>
+              <a:rPr lang="en-US" dirty="0"/>
+              <a:t>   1 0.56824   4.8675     32    205 9.716e-13 ***</a:t>
+            </a:r>
+          </a:p>
+          <a:p>
+            <a:r>
+              <a:rPr lang="en-US" dirty="0"/>
+              <a:t>Residuals                  236                                             </a:t>
+            </a:r>
+          </a:p>
+          <a:p>
+            <a:r>
+              <a:rPr lang="en-US" dirty="0"/>
+              <a:t>---</a:t>
+            </a:r>
+          </a:p>
+          <a:p>
+            <a:r>
+              <a:rPr lang="en-US" dirty="0" err="1"/>
+              <a:t>Signif</a:t>
+            </a:r>
+            <a:r>
+              <a:rPr lang="en-US" dirty="0"/>
+              <a:t>. codes:  0 ‘***’ 0.001 ‘**’ 0.01 ‘*’ 0.05 ‘.’ 0.1 ‘ ’ 1</a:t>
+            </a:r>
+          </a:p>
+        </p:txBody>
+      </p:sp>
+    </p:spTree>
+    <p:extLst>
+      <p:ext uri="{BB962C8B-B14F-4D97-AF65-F5344CB8AC3E}">
+        <p14:creationId xmlns:p14="http://schemas.microsoft.com/office/powerpoint/2010/main" val="291218721"/>
       </p:ext>
     </p:extLst>
   </p:cSld>

</xml_diff>